<commit_message>
still working on it!
</commit_message>
<xml_diff>
--- a/Arista Programmability.pptx
+++ b/Arista Programmability.pptx
@@ -10,13 +10,14 @@
     <p:sldId id="258" r:id="rId4"/>
     <p:sldId id="259" r:id="rId5"/>
     <p:sldId id="267" r:id="rId6"/>
-    <p:sldId id="260" r:id="rId7"/>
-    <p:sldId id="262" r:id="rId8"/>
+    <p:sldId id="262" r:id="rId7"/>
+    <p:sldId id="260" r:id="rId8"/>
     <p:sldId id="261" r:id="rId9"/>
-    <p:sldId id="263" r:id="rId10"/>
-    <p:sldId id="264" r:id="rId11"/>
-    <p:sldId id="265" r:id="rId12"/>
-    <p:sldId id="266" r:id="rId13"/>
+    <p:sldId id="268" r:id="rId10"/>
+    <p:sldId id="263" r:id="rId11"/>
+    <p:sldId id="264" r:id="rId12"/>
+    <p:sldId id="265" r:id="rId13"/>
+    <p:sldId id="266" r:id="rId14"/>
   </p:sldIdLst>
   <p:sldSz cx="12192000" cy="6858000"/>
   <p:notesSz cx="6858000" cy="9144000"/>
@@ -3062,7 +3063,7 @@
           <a:p>
             <a:r>
               <a:rPr lang="en-US" dirty="0"/>
-              <a:t>EOSSDK</a:t>
+              <a:t>PowerShell</a:t>
             </a:r>
           </a:p>
         </p:txBody>
@@ -3082,75 +3083,14 @@
           <a:bodyPr/>
           <a:lstStyle/>
           <a:p>
-            <a:r>
-              <a:rPr lang="en-US" dirty="0"/>
-              <a:t>What for? An on-box agent to handle events (a reactor)</a:t>
-            </a:r>
-          </a:p>
-          <a:p>
-            <a:pPr marL="457200" lvl="1" indent="0">
-              <a:buNone/>
-            </a:pPr>
-            <a:endParaRPr lang="en-US" dirty="0"/>
-          </a:p>
-          <a:p>
-            <a:pPr marL="457200" lvl="1" indent="0">
-              <a:buNone/>
-            </a:pPr>
-            <a:r>
-              <a:rPr lang="en-US" dirty="0"/>
-              <a:t>Examples</a:t>
-            </a:r>
-          </a:p>
-          <a:p>
-            <a:pPr lvl="2"/>
-            <a:r>
-              <a:rPr lang="en-US" dirty="0"/>
-              <a:t>Stream counters (see </a:t>
-            </a:r>
-            <a:r>
-              <a:rPr lang="en-US" dirty="0" err="1"/>
-              <a:t>TerminAttr</a:t>
-            </a:r>
-            <a:r>
-              <a:rPr lang="en-US" dirty="0"/>
-              <a:t>)</a:t>
-            </a:r>
-          </a:p>
-          <a:p>
-            <a:pPr lvl="2"/>
-            <a:r>
-              <a:rPr lang="en-US" dirty="0"/>
-              <a:t>Make run-time changes to routing tables, ACLs, etc.</a:t>
-            </a:r>
-          </a:p>
-          <a:p>
-            <a:pPr lvl="2"/>
-            <a:r>
-              <a:rPr lang="en-US" dirty="0"/>
-              <a:t>Reacting to congestion or denial of services attacks…</a:t>
-            </a:r>
-          </a:p>
-          <a:p>
-            <a:pPr lvl="2"/>
-            <a:r>
-              <a:rPr lang="en-US" dirty="0"/>
-              <a:t>Now I’m rambling… Just look here: </a:t>
-            </a:r>
-            <a:r>
-              <a:rPr lang="en-US" dirty="0">
-                <a:hlinkClick r:id="rId2"/>
-              </a:rPr>
-              <a:t>https://github.com/aristanetworks/EosSdk/wiki</a:t>
-            </a:r>
-            <a:endParaRPr lang="en-US" dirty="0"/>
+            <a:endParaRPr lang="en-US"/>
           </a:p>
         </p:txBody>
       </p:sp>
     </p:spTree>
     <p:extLst>
       <p:ext uri="{BB962C8B-B14F-4D97-AF65-F5344CB8AC3E}">
-        <p14:creationId xmlns:p14="http://schemas.microsoft.com/office/powerpoint/2010/main" val="3827071135"/>
+        <p14:creationId xmlns:p14="http://schemas.microsoft.com/office/powerpoint/2010/main" val="4035976657"/>
       </p:ext>
     </p:extLst>
   </p:cSld>
@@ -3194,7 +3134,7 @@
           <a:p>
             <a:r>
               <a:rPr lang="en-US" dirty="0"/>
-              <a:t>EOSSDK: Hello World</a:t>
+              <a:t>EOSSDK</a:t>
             </a:r>
           </a:p>
         </p:txBody>
@@ -3209,32 +3149,80 @@
             <p:ph idx="1"/>
           </p:nvPr>
         </p:nvSpPr>
-        <p:spPr>
-          <a:xfrm>
-            <a:off x="492210" y="1690688"/>
-            <a:ext cx="4516395" cy="415067"/>
-          </a:xfrm>
-        </p:spPr>
-        <p:txBody>
-          <a:bodyPr>
-            <a:normAutofit fontScale="92500" lnSpcReduction="10000"/>
-          </a:bodyPr>
-          <a:lstStyle/>
-          <a:p>
-            <a:pPr marL="0" indent="0">
+        <p:spPr/>
+        <p:txBody>
+          <a:bodyPr/>
+          <a:lstStyle/>
+          <a:p>
+            <a:r>
+              <a:rPr lang="en-US" dirty="0"/>
+              <a:t>What for? An on-box agent to handle events (a reactor)</a:t>
+            </a:r>
+          </a:p>
+          <a:p>
+            <a:pPr marL="457200" lvl="1" indent="0">
               <a:buNone/>
             </a:pPr>
+            <a:endParaRPr lang="en-US" dirty="0"/>
+          </a:p>
+          <a:p>
+            <a:pPr marL="457200" lvl="1" indent="0">
+              <a:buNone/>
+            </a:pPr>
             <a:r>
               <a:rPr lang="en-US" dirty="0"/>
-              <a:t>Let’s stick to python for now…</a:t>
-            </a:r>
+              <a:t>Examples</a:t>
+            </a:r>
+          </a:p>
+          <a:p>
+            <a:pPr lvl="2"/>
+            <a:r>
+              <a:rPr lang="en-US" dirty="0"/>
+              <a:t>Stream counters (see </a:t>
+            </a:r>
+            <a:r>
+              <a:rPr lang="en-US" dirty="0" err="1"/>
+              <a:t>TerminAttr</a:t>
+            </a:r>
+            <a:r>
+              <a:rPr lang="en-US" dirty="0"/>
+              <a:t>)</a:t>
+            </a:r>
+          </a:p>
+          <a:p>
+            <a:pPr lvl="2"/>
+            <a:r>
+              <a:rPr lang="en-US" dirty="0"/>
+              <a:t>Make run-time changes to routing tables, ACLs, etc.</a:t>
+            </a:r>
+          </a:p>
+          <a:p>
+            <a:pPr lvl="2"/>
+            <a:r>
+              <a:rPr lang="en-US" dirty="0"/>
+              <a:t>Reacting to congestion or denial of services attacks…</a:t>
+            </a:r>
+          </a:p>
+          <a:p>
+            <a:pPr lvl="2"/>
+            <a:r>
+              <a:rPr lang="en-US" dirty="0"/>
+              <a:t>Now I’m rambling… Just look here: </a:t>
+            </a:r>
+            <a:r>
+              <a:rPr lang="en-US" dirty="0">
+                <a:hlinkClick r:id="rId2"/>
+              </a:rPr>
+              <a:t>https://github.com/aristanetworks/EosSdk/wiki</a:t>
+            </a:r>
+            <a:endParaRPr lang="en-US" dirty="0"/>
           </a:p>
         </p:txBody>
       </p:sp>
     </p:spTree>
     <p:extLst>
       <p:ext uri="{BB962C8B-B14F-4D97-AF65-F5344CB8AC3E}">
-        <p14:creationId xmlns:p14="http://schemas.microsoft.com/office/powerpoint/2010/main" val="705243001"/>
+        <p14:creationId xmlns:p14="http://schemas.microsoft.com/office/powerpoint/2010/main" val="3827071135"/>
       </p:ext>
     </p:extLst>
   </p:cSld>
@@ -3278,27 +3266,92 @@
           <a:p>
             <a:r>
               <a:rPr lang="en-US" dirty="0"/>
+              <a:t>EOSSDK: Hello World</a:t>
+            </a:r>
+          </a:p>
+        </p:txBody>
+      </p:sp>
+      <p:sp>
+        <p:nvSpPr>
+          <p:cNvPr id="3" name="Content Placeholder 2"/>
+          <p:cNvSpPr>
+            <a:spLocks noGrp="1"/>
+          </p:cNvSpPr>
+          <p:nvPr>
+            <p:ph idx="1"/>
+          </p:nvPr>
+        </p:nvSpPr>
+        <p:spPr>
+          <a:xfrm>
+            <a:off x="492210" y="1690688"/>
+            <a:ext cx="4516395" cy="415067"/>
+          </a:xfrm>
+        </p:spPr>
+        <p:txBody>
+          <a:bodyPr>
+            <a:normAutofit fontScale="92500" lnSpcReduction="10000"/>
+          </a:bodyPr>
+          <a:lstStyle/>
+          <a:p>
+            <a:pPr marL="0" indent="0">
+              <a:buNone/>
+            </a:pPr>
+            <a:r>
+              <a:rPr lang="en-US" dirty="0"/>
+              <a:t>Let’s stick to python for now…</a:t>
+            </a:r>
+          </a:p>
+        </p:txBody>
+      </p:sp>
+    </p:spTree>
+    <p:extLst>
+      <p:ext uri="{BB962C8B-B14F-4D97-AF65-F5344CB8AC3E}">
+        <p14:creationId xmlns:p14="http://schemas.microsoft.com/office/powerpoint/2010/main" val="705243001"/>
+      </p:ext>
+    </p:extLst>
+  </p:cSld>
+  <p:clrMapOvr>
+    <a:masterClrMapping/>
+  </p:clrMapOvr>
+</p:sld>
+</file>
+
+<file path=ppt/slides/slide13.xml><?xml version="1.0" encoding="utf-8"?>
+<p:sld xmlns:a="http://schemas.openxmlformats.org/drawingml/2006/main" xmlns:r="http://schemas.openxmlformats.org/officeDocument/2006/relationships" xmlns:p="http://schemas.openxmlformats.org/presentationml/2006/main">
+  <p:cSld>
+    <p:spTree>
+      <p:nvGrpSpPr>
+        <p:cNvPr id="1" name=""/>
+        <p:cNvGrpSpPr/>
+        <p:nvPr/>
+      </p:nvGrpSpPr>
+      <p:grpSpPr>
+        <a:xfrm>
+          <a:off x="0" y="0"/>
+          <a:ext cx="0" cy="0"/>
+          <a:chOff x="0" y="0"/>
+          <a:chExt cx="0" cy="0"/>
+        </a:xfrm>
+      </p:grpSpPr>
+      <p:sp>
+        <p:nvSpPr>
+          <p:cNvPr id="2" name="Title 1"/>
+          <p:cNvSpPr>
+            <a:spLocks noGrp="1"/>
+          </p:cNvSpPr>
+          <p:nvPr>
+            <p:ph type="title"/>
+          </p:nvPr>
+        </p:nvSpPr>
+        <p:spPr/>
+        <p:txBody>
+          <a:bodyPr/>
+          <a:lstStyle/>
+          <a:p>
+            <a:r>
+              <a:rPr lang="en-US" dirty="0"/>
               <a:t>EOSSDK: A More Useful Example?</a:t>
             </a:r>
-          </a:p>
-        </p:txBody>
-      </p:sp>
-      <p:sp>
-        <p:nvSpPr>
-          <p:cNvPr id="3" name="Content Placeholder 2"/>
-          <p:cNvSpPr>
-            <a:spLocks noGrp="1"/>
-          </p:cNvSpPr>
-          <p:nvPr>
-            <p:ph idx="1"/>
-          </p:nvPr>
-        </p:nvSpPr>
-        <p:spPr/>
-        <p:txBody>
-          <a:bodyPr/>
-          <a:lstStyle/>
-          <a:p>
-            <a:endParaRPr lang="en-US" dirty="0"/>
           </a:p>
         </p:txBody>
       </p:sp>
@@ -4356,7 +4409,7 @@
         </p:nvSpPr>
         <p:spPr>
           <a:xfrm>
-            <a:off x="838200" y="5790670"/>
+            <a:off x="838200" y="5875865"/>
             <a:ext cx="10202333" cy="523220"/>
           </a:xfrm>
           <a:prstGeom prst="rect">
@@ -4372,13 +4425,8 @@
           <a:p>
             <a:r>
               <a:rPr lang="en-US" sz="2800" dirty="0"/>
-              <a:t>Take away: don’t bother with urllib2 – use a wrapper </a:t>
-            </a:r>
-            <a:r>
-              <a:rPr lang="en-US" sz="2800"/>
-              <a:t>like ‘requests’</a:t>
-            </a:r>
-            <a:endParaRPr lang="en-US" sz="2800" dirty="0"/>
+              <a:t>Take away: don’t bother with urllib2 – use a wrapper like ‘requests’</a:t>
+            </a:r>
           </a:p>
         </p:txBody>
       </p:sp>
@@ -4466,15 +4514,7 @@
           <a:p>
             <a:r>
               <a:rPr lang="en-US" dirty="0"/>
-              <a:t>Handling </a:t>
-            </a:r>
-            <a:r>
-              <a:rPr lang="en-US" dirty="0" err="1"/>
-              <a:t>eAPI</a:t>
-            </a:r>
-            <a:r>
-              <a:rPr lang="en-US" dirty="0"/>
-              <a:t> Responses</a:t>
+              <a:t>Escaping from the CLI</a:t>
             </a:r>
           </a:p>
         </p:txBody>
@@ -4501,7 +4541,7 @@
     </p:spTree>
     <p:extLst>
       <p:ext uri="{BB962C8B-B14F-4D97-AF65-F5344CB8AC3E}">
-        <p14:creationId xmlns:p14="http://schemas.microsoft.com/office/powerpoint/2010/main" val="3097969742"/>
+        <p14:creationId xmlns:p14="http://schemas.microsoft.com/office/powerpoint/2010/main" val="185927841"/>
       </p:ext>
     </p:extLst>
   </p:cSld>
@@ -4545,7 +4585,15 @@
           <a:p>
             <a:r>
               <a:rPr lang="en-US" dirty="0"/>
-              <a:t>Escaping from the CLI</a:t>
+              <a:t>Handling </a:t>
+            </a:r>
+            <a:r>
+              <a:rPr lang="en-US" dirty="0" err="1"/>
+              <a:t>eAPI</a:t>
+            </a:r>
+            <a:r>
+              <a:rPr lang="en-US" dirty="0"/>
+              <a:t> Responses</a:t>
             </a:r>
           </a:p>
         </p:txBody>
@@ -4560,19 +4608,40 @@
             <p:ph idx="1"/>
           </p:nvPr>
         </p:nvSpPr>
-        <p:spPr/>
-        <p:txBody>
-          <a:bodyPr/>
-          <a:lstStyle/>
-          <a:p>
-            <a:endParaRPr lang="en-US" dirty="0"/>
+        <p:spPr>
+          <a:xfrm>
+            <a:off x="838200" y="1460500"/>
+            <a:ext cx="5807927" cy="460375"/>
+          </a:xfrm>
+        </p:spPr>
+        <p:txBody>
+          <a:bodyPr>
+            <a:normAutofit lnSpcReduction="10000"/>
+          </a:bodyPr>
+          <a:lstStyle/>
+          <a:p>
+            <a:pPr marL="0" indent="0">
+              <a:buNone/>
+            </a:pPr>
+            <a:r>
+              <a:rPr lang="en-US" dirty="0"/>
+              <a:t>All </a:t>
+            </a:r>
+            <a:r>
+              <a:rPr lang="en-US" dirty="0" err="1"/>
+              <a:t>eAPI</a:t>
+            </a:r>
+            <a:r>
+              <a:rPr lang="en-US" dirty="0"/>
+              <a:t> responses are JSON formatted</a:t>
+            </a:r>
           </a:p>
         </p:txBody>
       </p:sp>
     </p:spTree>
     <p:extLst>
       <p:ext uri="{BB962C8B-B14F-4D97-AF65-F5344CB8AC3E}">
-        <p14:creationId xmlns:p14="http://schemas.microsoft.com/office/powerpoint/2010/main" val="185927841"/>
+        <p14:creationId xmlns:p14="http://schemas.microsoft.com/office/powerpoint/2010/main" val="3097969742"/>
       </p:ext>
     </p:extLst>
   </p:cSld>
@@ -4599,6 +4668,36 @@
           <a:chExt cx="0" cy="0"/>
         </a:xfrm>
       </p:grpSpPr>
+      <p:pic>
+        <p:nvPicPr>
+          <p:cNvPr id="9" name="Picture 8"/>
+          <p:cNvPicPr>
+            <a:picLocks noChangeAspect="1"/>
+          </p:cNvPicPr>
+          <p:nvPr/>
+        </p:nvPicPr>
+        <p:blipFill>
+          <a:blip r:embed="rId2">
+            <a:extLst>
+              <a:ext uri="{28A0092B-C50C-407E-A947-70E740481C1C}">
+                <a14:useLocalDpi xmlns:a14="http://schemas.microsoft.com/office/drawing/2010/main" val="0"/>
+              </a:ext>
+            </a:extLst>
+          </a:blip>
+          <a:stretch>
+            <a:fillRect/>
+          </a:stretch>
+        </p:blipFill>
+        <p:spPr>
+          <a:xfrm>
+            <a:off x="0" y="1269484"/>
+            <a:ext cx="12192000" cy="6397214"/>
+          </a:xfrm>
+          <a:prstGeom prst="rect">
+            <a:avLst/>
+          </a:prstGeom>
+        </p:spPr>
+      </p:pic>
       <p:sp>
         <p:nvSpPr>
           <p:cNvPr id="2" name="Title 1"/>
@@ -4614,37 +4713,370 @@
           <a:bodyPr/>
           <a:lstStyle/>
           <a:p>
-            <a:r>
-              <a:rPr lang="en-US" dirty="0"/>
-              <a:t>Handling Errors from </a:t>
-            </a:r>
             <a:r>
               <a:rPr lang="en-US" dirty="0" err="1"/>
               <a:t>eAPI</a:t>
             </a:r>
-            <a:endParaRPr lang="en-US" dirty="0"/>
-          </a:p>
-        </p:txBody>
-      </p:sp>
-      <p:sp>
-        <p:nvSpPr>
-          <p:cNvPr id="3" name="Content Placeholder 2"/>
-          <p:cNvSpPr>
-            <a:spLocks noGrp="1"/>
-          </p:cNvSpPr>
+            <a:r>
+              <a:rPr lang="en-US" dirty="0"/>
+              <a:t>: Handling Errors</a:t>
+            </a:r>
+          </a:p>
+        </p:txBody>
+      </p:sp>
+      <p:sp>
+        <p:nvSpPr>
+          <p:cNvPr id="5" name="TextBox 4"/>
+          <p:cNvSpPr txBox="1"/>
+          <p:nvPr/>
+        </p:nvSpPr>
+        <p:spPr>
+          <a:xfrm rot="689752">
+            <a:off x="224838" y="2894433"/>
+            <a:ext cx="10404111" cy="2308324"/>
+          </a:xfrm>
+          <a:prstGeom prst="rect">
+            <a:avLst/>
+          </a:prstGeom>
+          <a:noFill/>
+        </p:spPr>
+        <p:txBody>
+          <a:bodyPr wrap="square" rtlCol="0">
+            <a:spAutoFit/>
+          </a:bodyPr>
+          <a:lstStyle/>
+          <a:p>
+            <a:r>
+              <a:rPr lang="en-US" dirty="0">
+                <a:latin typeface="Consolas" panose="020B0609020204030204" pitchFamily="49" charset="0"/>
+              </a:rPr>
+              <a:t>Traceback (most recent call last):</a:t>
+            </a:r>
+          </a:p>
+          <a:p>
+            <a:r>
+              <a:rPr lang="en-US" dirty="0">
+                <a:latin typeface="Consolas" panose="020B0609020204030204" pitchFamily="49" charset="0"/>
+              </a:rPr>
+              <a:t>  File "eapi_client.py", line 372, in &lt;module&gt;</a:t>
+            </a:r>
+          </a:p>
+          <a:p>
+            <a:r>
+              <a:rPr lang="en-US" dirty="0">
+                <a:latin typeface="Consolas" panose="020B0609020204030204" pitchFamily="49" charset="0"/>
+              </a:rPr>
+              <a:t>    main()</a:t>
+            </a:r>
+          </a:p>
+          <a:p>
+            <a:r>
+              <a:rPr lang="en-US" dirty="0">
+                <a:latin typeface="Consolas" panose="020B0609020204030204" pitchFamily="49" charset="0"/>
+              </a:rPr>
+              <a:t>  File "eapi_client.py", line 356, in main</a:t>
+            </a:r>
+          </a:p>
+          <a:p>
+            <a:r>
+              <a:rPr lang="en-US" dirty="0">
+                <a:latin typeface="Consolas" panose="020B0609020204030204" pitchFamily="49" charset="0"/>
+              </a:rPr>
+              <a:t>    response = </a:t>
+            </a:r>
+            <a:r>
+              <a:rPr lang="en-US" dirty="0" err="1">
+                <a:latin typeface="Consolas" panose="020B0609020204030204" pitchFamily="49" charset="0"/>
+              </a:rPr>
+              <a:t>client.send</a:t>
+            </a:r>
+            <a:r>
+              <a:rPr lang="en-US" dirty="0">
+                <a:latin typeface="Consolas" panose="020B0609020204030204" pitchFamily="49" charset="0"/>
+              </a:rPr>
+              <a:t>(commands)</a:t>
+            </a:r>
+          </a:p>
+          <a:p>
+            <a:r>
+              <a:rPr lang="en-US" dirty="0">
+                <a:latin typeface="Consolas" panose="020B0609020204030204" pitchFamily="49" charset="0"/>
+              </a:rPr>
+              <a:t>  File "eapi_client.py", line 288, in send</a:t>
+            </a:r>
+          </a:p>
+          <a:p>
+            <a:r>
+              <a:rPr lang="en-US" dirty="0">
+                <a:latin typeface="Consolas" panose="020B0609020204030204" pitchFamily="49" charset="0"/>
+              </a:rPr>
+              <a:t>    raise </a:t>
+            </a:r>
+            <a:r>
+              <a:rPr lang="en-US" dirty="0" err="1">
+                <a:latin typeface="Consolas" panose="020B0609020204030204" pitchFamily="49" charset="0"/>
+              </a:rPr>
+              <a:t>EapiException</a:t>
+            </a:r>
+            <a:r>
+              <a:rPr lang="en-US" dirty="0">
+                <a:latin typeface="Consolas" panose="020B0609020204030204" pitchFamily="49" charset="0"/>
+              </a:rPr>
+              <a:t>(response["error"]["message"])</a:t>
+            </a:r>
+          </a:p>
+          <a:p>
+            <a:r>
+              <a:rPr lang="en-US" dirty="0">
+                <a:latin typeface="Consolas" panose="020B0609020204030204" pitchFamily="49" charset="0"/>
+              </a:rPr>
+              <a:t>__main__.</a:t>
+            </a:r>
+            <a:r>
+              <a:rPr lang="en-US" dirty="0" err="1">
+                <a:latin typeface="Consolas" panose="020B0609020204030204" pitchFamily="49" charset="0"/>
+              </a:rPr>
+              <a:t>EapiException</a:t>
+            </a:r>
+            <a:r>
+              <a:rPr lang="en-US" dirty="0">
+                <a:latin typeface="Consolas" panose="020B0609020204030204" pitchFamily="49" charset="0"/>
+              </a:rPr>
+              <a:t>: CLI command 1 of 1 'show venison' failed: invalid command</a:t>
+            </a:r>
+            <a:endParaRPr lang="en-US" dirty="0">
+              <a:latin typeface="Consolas" panose="020B0609020204030204" pitchFamily="49" charset="0"/>
+            </a:endParaRPr>
+          </a:p>
+        </p:txBody>
+      </p:sp>
+      <p:sp>
+        <p:nvSpPr>
+          <p:cNvPr id="6" name="TextBox 5"/>
+          <p:cNvSpPr txBox="1"/>
+          <p:nvPr/>
+        </p:nvSpPr>
+        <p:spPr>
+          <a:xfrm rot="19673558">
+            <a:off x="6649450" y="1727708"/>
+            <a:ext cx="5977264" cy="2308324"/>
+          </a:xfrm>
+          <a:prstGeom prst="rect">
+            <a:avLst/>
+          </a:prstGeom>
+          <a:noFill/>
+        </p:spPr>
+        <p:txBody>
+          <a:bodyPr wrap="square" rtlCol="0">
+            <a:spAutoFit/>
+          </a:bodyPr>
+          <a:lstStyle/>
+          <a:p>
+            <a:r>
+              <a:rPr lang="en-US" dirty="0">
+                <a:latin typeface="Consolas" panose="020B0609020204030204" pitchFamily="49" charset="0"/>
+              </a:rPr>
+              <a:t>Traceback (most recent call last):</a:t>
+            </a:r>
+          </a:p>
+          <a:p>
+            <a:r>
+              <a:rPr lang="en-US" dirty="0">
+                <a:latin typeface="Consolas" panose="020B0609020204030204" pitchFamily="49" charset="0"/>
+              </a:rPr>
+              <a:t>  File "eapi_client.py", line 372, in &lt;module&gt;</a:t>
+            </a:r>
+          </a:p>
+          <a:p>
+            <a:r>
+              <a:rPr lang="en-US" dirty="0">
+                <a:latin typeface="Consolas" panose="020B0609020204030204" pitchFamily="49" charset="0"/>
+              </a:rPr>
+              <a:t>    main()</a:t>
+            </a:r>
+          </a:p>
+          <a:p>
+            <a:r>
+              <a:rPr lang="en-US" dirty="0">
+                <a:latin typeface="Consolas" panose="020B0609020204030204" pitchFamily="49" charset="0"/>
+              </a:rPr>
+              <a:t>  File "eapi_client.py", line 356, in main</a:t>
+            </a:r>
+          </a:p>
+          <a:p>
+            <a:r>
+              <a:rPr lang="en-US" dirty="0">
+                <a:latin typeface="Consolas" panose="020B0609020204030204" pitchFamily="49" charset="0"/>
+              </a:rPr>
+              <a:t>    response = </a:t>
+            </a:r>
+            <a:r>
+              <a:rPr lang="en-US" dirty="0" err="1">
+                <a:latin typeface="Consolas" panose="020B0609020204030204" pitchFamily="49" charset="0"/>
+              </a:rPr>
+              <a:t>client.send</a:t>
+            </a:r>
+            <a:r>
+              <a:rPr lang="en-US" dirty="0">
+                <a:latin typeface="Consolas" panose="020B0609020204030204" pitchFamily="49" charset="0"/>
+              </a:rPr>
+              <a:t>(commands)</a:t>
+            </a:r>
+          </a:p>
+          <a:p>
+            <a:r>
+              <a:rPr lang="en-US" dirty="0">
+                <a:latin typeface="Consolas" panose="020B0609020204030204" pitchFamily="49" charset="0"/>
+              </a:rPr>
+              <a:t>  File "eapi_client.py", line 290, in send</a:t>
+            </a:r>
+          </a:p>
+          <a:p>
+            <a:r>
+              <a:rPr lang="en-US" dirty="0">
+                <a:latin typeface="Consolas" panose="020B0609020204030204" pitchFamily="49" charset="0"/>
+              </a:rPr>
+              <a:t>    return response["result"]</a:t>
+            </a:r>
+          </a:p>
+          <a:p>
+            <a:r>
+              <a:rPr lang="en-US" dirty="0" err="1">
+                <a:latin typeface="Consolas" panose="020B0609020204030204" pitchFamily="49" charset="0"/>
+              </a:rPr>
+              <a:t>KeyError</a:t>
+            </a:r>
+            <a:r>
+              <a:rPr lang="en-US" dirty="0">
+                <a:latin typeface="Consolas" panose="020B0609020204030204" pitchFamily="49" charset="0"/>
+              </a:rPr>
+              <a:t>: 'result'</a:t>
+            </a:r>
+            <a:endParaRPr lang="en-US" dirty="0">
+              <a:latin typeface="Consolas" panose="020B0609020204030204" pitchFamily="49" charset="0"/>
+            </a:endParaRPr>
+          </a:p>
+        </p:txBody>
+      </p:sp>
+      <p:pic>
+        <p:nvPicPr>
+          <p:cNvPr id="4" name="Content Placeholder 3"/>
+          <p:cNvPicPr>
+            <a:picLocks noGrp="1" noChangeAspect="1"/>
+          </p:cNvPicPr>
           <p:nvPr>
             <p:ph idx="1"/>
           </p:nvPr>
-        </p:nvSpPr>
-        <p:spPr/>
-        <p:txBody>
-          <a:bodyPr/>
-          <a:lstStyle/>
-          <a:p>
-            <a:endParaRPr lang="en-US" dirty="0"/>
-          </a:p>
-        </p:txBody>
-      </p:sp>
+        </p:nvPicPr>
+        <p:blipFill>
+          <a:blip r:embed="rId3">
+            <a:extLst>
+              <a:ext uri="{28A0092B-C50C-407E-A947-70E740481C1C}">
+                <a14:useLocalDpi xmlns:a14="http://schemas.microsoft.com/office/drawing/2010/main" val="0"/>
+              </a:ext>
+            </a:extLst>
+          </a:blip>
+          <a:stretch>
+            <a:fillRect/>
+          </a:stretch>
+        </p:blipFill>
+        <p:spPr>
+          <a:xfrm>
+            <a:off x="2882874" y="1690688"/>
+            <a:ext cx="5801783" cy="4351338"/>
+          </a:xfrm>
+        </p:spPr>
+      </p:pic>
+      <p:pic>
+        <p:nvPicPr>
+          <p:cNvPr id="7" name="Picture 6"/>
+          <p:cNvPicPr>
+            <a:picLocks noChangeAspect="1"/>
+          </p:cNvPicPr>
+          <p:nvPr/>
+        </p:nvPicPr>
+        <p:blipFill>
+          <a:blip r:embed="rId4">
+            <a:extLst>
+              <a:ext uri="{28A0092B-C50C-407E-A947-70E740481C1C}">
+                <a14:useLocalDpi xmlns:a14="http://schemas.microsoft.com/office/drawing/2010/main" val="0"/>
+              </a:ext>
+            </a:extLst>
+          </a:blip>
+          <a:stretch>
+            <a:fillRect/>
+          </a:stretch>
+        </p:blipFill>
+        <p:spPr>
+          <a:xfrm>
+            <a:off x="4386958" y="2059192"/>
+            <a:ext cx="3143250" cy="3810000"/>
+          </a:xfrm>
+          <a:prstGeom prst="rect">
+            <a:avLst/>
+          </a:prstGeom>
+        </p:spPr>
+      </p:pic>
+      <p:pic>
+        <p:nvPicPr>
+          <p:cNvPr id="10" name="Picture 9"/>
+          <p:cNvPicPr>
+            <a:picLocks noChangeAspect="1"/>
+          </p:cNvPicPr>
+          <p:nvPr/>
+        </p:nvPicPr>
+        <p:blipFill>
+          <a:blip r:embed="rId4">
+            <a:extLst>
+              <a:ext uri="{28A0092B-C50C-407E-A947-70E740481C1C}">
+                <a14:useLocalDpi xmlns:a14="http://schemas.microsoft.com/office/drawing/2010/main" val="0"/>
+              </a:ext>
+            </a:extLst>
+          </a:blip>
+          <a:stretch>
+            <a:fillRect/>
+          </a:stretch>
+        </p:blipFill>
+        <p:spPr>
+          <a:xfrm>
+            <a:off x="616458" y="1052196"/>
+            <a:ext cx="3143250" cy="3810000"/>
+          </a:xfrm>
+          <a:prstGeom prst="rect">
+            <a:avLst/>
+          </a:prstGeom>
+        </p:spPr>
+      </p:pic>
+      <p:pic>
+        <p:nvPicPr>
+          <p:cNvPr id="11" name="Picture 10"/>
+          <p:cNvPicPr>
+            <a:picLocks noChangeAspect="1"/>
+          </p:cNvPicPr>
+          <p:nvPr/>
+        </p:nvPicPr>
+        <p:blipFill>
+          <a:blip r:embed="rId4">
+            <a:extLst>
+              <a:ext uri="{28A0092B-C50C-407E-A947-70E740481C1C}">
+                <a14:useLocalDpi xmlns:a14="http://schemas.microsoft.com/office/drawing/2010/main" val="0"/>
+              </a:ext>
+            </a:extLst>
+          </a:blip>
+          <a:stretch>
+            <a:fillRect/>
+          </a:stretch>
+        </p:blipFill>
+        <p:spPr>
+          <a:xfrm>
+            <a:off x="8238613" y="842343"/>
+            <a:ext cx="3143250" cy="3810000"/>
+          </a:xfrm>
+          <a:prstGeom prst="rect">
+            <a:avLst/>
+          </a:prstGeom>
+        </p:spPr>
+      </p:pic>
     </p:spTree>
     <p:extLst>
       <p:ext uri="{BB962C8B-B14F-4D97-AF65-F5344CB8AC3E}">
@@ -4655,6 +5087,618 @@
   <p:clrMapOvr>
     <a:masterClrMapping/>
   </p:clrMapOvr>
+  <p:timing>
+    <p:tnLst>
+      <p:par>
+        <p:cTn id="1" dur="indefinite" restart="never" nodeType="tmRoot">
+          <p:childTnLst>
+            <p:seq concurrent="1" nextAc="seek">
+              <p:cTn id="2" dur="indefinite" nodeType="mainSeq">
+                <p:childTnLst>
+                  <p:par>
+                    <p:cTn id="3" fill="hold">
+                      <p:stCondLst>
+                        <p:cond delay="indefinite"/>
+                      </p:stCondLst>
+                      <p:childTnLst>
+                        <p:par>
+                          <p:cTn id="4" fill="hold">
+                            <p:stCondLst>
+                              <p:cond delay="0"/>
+                            </p:stCondLst>
+                            <p:childTnLst>
+                              <p:par>
+                                <p:cTn id="5" presetID="45" presetClass="exit" presetSubtype="0" fill="hold" nodeType="clickEffect">
+                                  <p:stCondLst>
+                                    <p:cond delay="0"/>
+                                  </p:stCondLst>
+                                  <p:childTnLst>
+                                    <p:animEffect transition="out" filter="fade">
+                                      <p:cBhvr>
+                                        <p:cTn id="6" dur="2000"/>
+                                        <p:tgtEl>
+                                          <p:spTgt spid="7"/>
+                                        </p:tgtEl>
+                                      </p:cBhvr>
+                                    </p:animEffect>
+                                    <p:anim calcmode="lin" valueType="num">
+                                      <p:cBhvr>
+                                        <p:cTn id="7" dur="2000"/>
+                                        <p:tgtEl>
+                                          <p:spTgt spid="7"/>
+                                        </p:tgtEl>
+                                        <p:attrNameLst>
+                                          <p:attrName>ppt_w</p:attrName>
+                                        </p:attrNameLst>
+                                      </p:cBhvr>
+                                      <p:tavLst>
+                                        <p:tav tm="0">
+                                          <p:val>
+                                            <p:strVal val="ppt_w"/>
+                                          </p:val>
+                                        </p:tav>
+                                        <p:tav tm="5000">
+                                          <p:val>
+                                            <p:strVal val="0.92*ppt_w"/>
+                                          </p:val>
+                                        </p:tav>
+                                        <p:tav tm="10000">
+                                          <p:val>
+                                            <p:strVal val="0.71*ppt_w"/>
+                                          </p:val>
+                                        </p:tav>
+                                        <p:tav tm="15000">
+                                          <p:val>
+                                            <p:strVal val="0.38*ppt_w"/>
+                                          </p:val>
+                                        </p:tav>
+                                        <p:tav tm="20000">
+                                          <p:val>
+                                            <p:fltVal val="0"/>
+                                          </p:val>
+                                        </p:tav>
+                                        <p:tav tm="25000">
+                                          <p:val>
+                                            <p:strVal val="-0.38*ppt_w"/>
+                                          </p:val>
+                                        </p:tav>
+                                        <p:tav tm="30000">
+                                          <p:val>
+                                            <p:strVal val="-0.71*ppt_w"/>
+                                          </p:val>
+                                        </p:tav>
+                                        <p:tav tm="35000">
+                                          <p:val>
+                                            <p:strVal val="-0.92*ppt_w"/>
+                                          </p:val>
+                                        </p:tav>
+                                        <p:tav tm="40000">
+                                          <p:val>
+                                            <p:strVal val="-ppt_w"/>
+                                          </p:val>
+                                        </p:tav>
+                                        <p:tav tm="45000">
+                                          <p:val>
+                                            <p:strVal val="-0.92*ppt_w"/>
+                                          </p:val>
+                                        </p:tav>
+                                        <p:tav tm="50000">
+                                          <p:val>
+                                            <p:strVal val="-0.71*ppt_w"/>
+                                          </p:val>
+                                        </p:tav>
+                                        <p:tav tm="55000">
+                                          <p:val>
+                                            <p:strVal val="-0.38*ppt_w"/>
+                                          </p:val>
+                                        </p:tav>
+                                        <p:tav tm="60000">
+                                          <p:val>
+                                            <p:fltVal val="0"/>
+                                          </p:val>
+                                        </p:tav>
+                                        <p:tav tm="65000">
+                                          <p:val>
+                                            <p:strVal val="0.38*ppt_w"/>
+                                          </p:val>
+                                        </p:tav>
+                                        <p:tav tm="70000">
+                                          <p:val>
+                                            <p:strVal val="0.71*ppt_w"/>
+                                          </p:val>
+                                        </p:tav>
+                                        <p:tav tm="75000">
+                                          <p:val>
+                                            <p:strVal val="0.92*ppt_w"/>
+                                          </p:val>
+                                        </p:tav>
+                                        <p:tav tm="80000">
+                                          <p:val>
+                                            <p:strVal val="ppt_w"/>
+                                          </p:val>
+                                        </p:tav>
+                                        <p:tav tm="85000">
+                                          <p:val>
+                                            <p:strVal val="0.92*ppt_w"/>
+                                          </p:val>
+                                        </p:tav>
+                                        <p:tav tm="90000">
+                                          <p:val>
+                                            <p:strVal val="0.71*ppt_w"/>
+                                          </p:val>
+                                        </p:tav>
+                                        <p:tav tm="95000">
+                                          <p:val>
+                                            <p:strVal val="0.38*ppt_w"/>
+                                          </p:val>
+                                        </p:tav>
+                                        <p:tav tm="100000">
+                                          <p:val>
+                                            <p:fltVal val="0"/>
+                                          </p:val>
+                                        </p:tav>
+                                      </p:tavLst>
+                                    </p:anim>
+                                    <p:anim calcmode="lin" valueType="num">
+                                      <p:cBhvr>
+                                        <p:cTn id="8" dur="2000"/>
+                                        <p:tgtEl>
+                                          <p:spTgt spid="7"/>
+                                        </p:tgtEl>
+                                        <p:attrNameLst>
+                                          <p:attrName>ppt_h</p:attrName>
+                                        </p:attrNameLst>
+                                      </p:cBhvr>
+                                      <p:tavLst>
+                                        <p:tav tm="0">
+                                          <p:val>
+                                            <p:strVal val="ppt_h"/>
+                                          </p:val>
+                                        </p:tav>
+                                        <p:tav tm="100000">
+                                          <p:val>
+                                            <p:strVal val="ppt_h"/>
+                                          </p:val>
+                                        </p:tav>
+                                      </p:tavLst>
+                                    </p:anim>
+                                    <p:set>
+                                      <p:cBhvr>
+                                        <p:cTn id="9" dur="1" fill="hold">
+                                          <p:stCondLst>
+                                            <p:cond delay="1999"/>
+                                          </p:stCondLst>
+                                        </p:cTn>
+                                        <p:tgtEl>
+                                          <p:spTgt spid="7"/>
+                                        </p:tgtEl>
+                                        <p:attrNameLst>
+                                          <p:attrName>style.visibility</p:attrName>
+                                        </p:attrNameLst>
+                                      </p:cBhvr>
+                                      <p:to>
+                                        <p:strVal val="hidden"/>
+                                      </p:to>
+                                    </p:set>
+                                  </p:childTnLst>
+                                </p:cTn>
+                              </p:par>
+                            </p:childTnLst>
+                          </p:cTn>
+                        </p:par>
+                      </p:childTnLst>
+                    </p:cTn>
+                  </p:par>
+                  <p:par>
+                    <p:cTn id="10" fill="hold">
+                      <p:stCondLst>
+                        <p:cond delay="indefinite"/>
+                      </p:stCondLst>
+                      <p:childTnLst>
+                        <p:par>
+                          <p:cTn id="11" fill="hold">
+                            <p:stCondLst>
+                              <p:cond delay="0"/>
+                            </p:stCondLst>
+                            <p:childTnLst>
+                              <p:par>
+                                <p:cTn id="12" presetID="45" presetClass="exit" presetSubtype="0" fill="hold" nodeType="clickEffect">
+                                  <p:stCondLst>
+                                    <p:cond delay="0"/>
+                                  </p:stCondLst>
+                                  <p:childTnLst>
+                                    <p:animEffect transition="out" filter="fade">
+                                      <p:cBhvr>
+                                        <p:cTn id="13" dur="2000"/>
+                                        <p:tgtEl>
+                                          <p:spTgt spid="10"/>
+                                        </p:tgtEl>
+                                      </p:cBhvr>
+                                    </p:animEffect>
+                                    <p:anim calcmode="lin" valueType="num">
+                                      <p:cBhvr>
+                                        <p:cTn id="14" dur="2000"/>
+                                        <p:tgtEl>
+                                          <p:spTgt spid="10"/>
+                                        </p:tgtEl>
+                                        <p:attrNameLst>
+                                          <p:attrName>ppt_w</p:attrName>
+                                        </p:attrNameLst>
+                                      </p:cBhvr>
+                                      <p:tavLst>
+                                        <p:tav tm="0">
+                                          <p:val>
+                                            <p:strVal val="ppt_w"/>
+                                          </p:val>
+                                        </p:tav>
+                                        <p:tav tm="5000">
+                                          <p:val>
+                                            <p:strVal val="0.92*ppt_w"/>
+                                          </p:val>
+                                        </p:tav>
+                                        <p:tav tm="10000">
+                                          <p:val>
+                                            <p:strVal val="0.71*ppt_w"/>
+                                          </p:val>
+                                        </p:tav>
+                                        <p:tav tm="15000">
+                                          <p:val>
+                                            <p:strVal val="0.38*ppt_w"/>
+                                          </p:val>
+                                        </p:tav>
+                                        <p:tav tm="20000">
+                                          <p:val>
+                                            <p:fltVal val="0"/>
+                                          </p:val>
+                                        </p:tav>
+                                        <p:tav tm="25000">
+                                          <p:val>
+                                            <p:strVal val="-0.38*ppt_w"/>
+                                          </p:val>
+                                        </p:tav>
+                                        <p:tav tm="30000">
+                                          <p:val>
+                                            <p:strVal val="-0.71*ppt_w"/>
+                                          </p:val>
+                                        </p:tav>
+                                        <p:tav tm="35000">
+                                          <p:val>
+                                            <p:strVal val="-0.92*ppt_w"/>
+                                          </p:val>
+                                        </p:tav>
+                                        <p:tav tm="40000">
+                                          <p:val>
+                                            <p:strVal val="-ppt_w"/>
+                                          </p:val>
+                                        </p:tav>
+                                        <p:tav tm="45000">
+                                          <p:val>
+                                            <p:strVal val="-0.92*ppt_w"/>
+                                          </p:val>
+                                        </p:tav>
+                                        <p:tav tm="50000">
+                                          <p:val>
+                                            <p:strVal val="-0.71*ppt_w"/>
+                                          </p:val>
+                                        </p:tav>
+                                        <p:tav tm="55000">
+                                          <p:val>
+                                            <p:strVal val="-0.38*ppt_w"/>
+                                          </p:val>
+                                        </p:tav>
+                                        <p:tav tm="60000">
+                                          <p:val>
+                                            <p:fltVal val="0"/>
+                                          </p:val>
+                                        </p:tav>
+                                        <p:tav tm="65000">
+                                          <p:val>
+                                            <p:strVal val="0.38*ppt_w"/>
+                                          </p:val>
+                                        </p:tav>
+                                        <p:tav tm="70000">
+                                          <p:val>
+                                            <p:strVal val="0.71*ppt_w"/>
+                                          </p:val>
+                                        </p:tav>
+                                        <p:tav tm="75000">
+                                          <p:val>
+                                            <p:strVal val="0.92*ppt_w"/>
+                                          </p:val>
+                                        </p:tav>
+                                        <p:tav tm="80000">
+                                          <p:val>
+                                            <p:strVal val="ppt_w"/>
+                                          </p:val>
+                                        </p:tav>
+                                        <p:tav tm="85000">
+                                          <p:val>
+                                            <p:strVal val="0.92*ppt_w"/>
+                                          </p:val>
+                                        </p:tav>
+                                        <p:tav tm="90000">
+                                          <p:val>
+                                            <p:strVal val="0.71*ppt_w"/>
+                                          </p:val>
+                                        </p:tav>
+                                        <p:tav tm="95000">
+                                          <p:val>
+                                            <p:strVal val="0.38*ppt_w"/>
+                                          </p:val>
+                                        </p:tav>
+                                        <p:tav tm="100000">
+                                          <p:val>
+                                            <p:fltVal val="0"/>
+                                          </p:val>
+                                        </p:tav>
+                                      </p:tavLst>
+                                    </p:anim>
+                                    <p:anim calcmode="lin" valueType="num">
+                                      <p:cBhvr>
+                                        <p:cTn id="15" dur="2000"/>
+                                        <p:tgtEl>
+                                          <p:spTgt spid="10"/>
+                                        </p:tgtEl>
+                                        <p:attrNameLst>
+                                          <p:attrName>ppt_h</p:attrName>
+                                        </p:attrNameLst>
+                                      </p:cBhvr>
+                                      <p:tavLst>
+                                        <p:tav tm="0">
+                                          <p:val>
+                                            <p:strVal val="ppt_h"/>
+                                          </p:val>
+                                        </p:tav>
+                                        <p:tav tm="100000">
+                                          <p:val>
+                                            <p:strVal val="ppt_h"/>
+                                          </p:val>
+                                        </p:tav>
+                                      </p:tavLst>
+                                    </p:anim>
+                                    <p:set>
+                                      <p:cBhvr>
+                                        <p:cTn id="16" dur="1" fill="hold">
+                                          <p:stCondLst>
+                                            <p:cond delay="1999"/>
+                                          </p:stCondLst>
+                                        </p:cTn>
+                                        <p:tgtEl>
+                                          <p:spTgt spid="10"/>
+                                        </p:tgtEl>
+                                        <p:attrNameLst>
+                                          <p:attrName>style.visibility</p:attrName>
+                                        </p:attrNameLst>
+                                      </p:cBhvr>
+                                      <p:to>
+                                        <p:strVal val="hidden"/>
+                                      </p:to>
+                                    </p:set>
+                                  </p:childTnLst>
+                                </p:cTn>
+                              </p:par>
+                            </p:childTnLst>
+                          </p:cTn>
+                        </p:par>
+                      </p:childTnLst>
+                    </p:cTn>
+                  </p:par>
+                  <p:par>
+                    <p:cTn id="17" fill="hold">
+                      <p:stCondLst>
+                        <p:cond delay="indefinite"/>
+                      </p:stCondLst>
+                      <p:childTnLst>
+                        <p:par>
+                          <p:cTn id="18" fill="hold">
+                            <p:stCondLst>
+                              <p:cond delay="0"/>
+                            </p:stCondLst>
+                            <p:childTnLst>
+                              <p:par>
+                                <p:cTn id="19" presetID="45" presetClass="exit" presetSubtype="0" fill="hold" nodeType="clickEffect">
+                                  <p:stCondLst>
+                                    <p:cond delay="0"/>
+                                  </p:stCondLst>
+                                  <p:childTnLst>
+                                    <p:animEffect transition="out" filter="fade">
+                                      <p:cBhvr>
+                                        <p:cTn id="20" dur="2000"/>
+                                        <p:tgtEl>
+                                          <p:spTgt spid="11"/>
+                                        </p:tgtEl>
+                                      </p:cBhvr>
+                                    </p:animEffect>
+                                    <p:anim calcmode="lin" valueType="num">
+                                      <p:cBhvr>
+                                        <p:cTn id="21" dur="2000"/>
+                                        <p:tgtEl>
+                                          <p:spTgt spid="11"/>
+                                        </p:tgtEl>
+                                        <p:attrNameLst>
+                                          <p:attrName>ppt_w</p:attrName>
+                                        </p:attrNameLst>
+                                      </p:cBhvr>
+                                      <p:tavLst>
+                                        <p:tav tm="0">
+                                          <p:val>
+                                            <p:strVal val="ppt_w"/>
+                                          </p:val>
+                                        </p:tav>
+                                        <p:tav tm="5000">
+                                          <p:val>
+                                            <p:strVal val="0.92*ppt_w"/>
+                                          </p:val>
+                                        </p:tav>
+                                        <p:tav tm="10000">
+                                          <p:val>
+                                            <p:strVal val="0.71*ppt_w"/>
+                                          </p:val>
+                                        </p:tav>
+                                        <p:tav tm="15000">
+                                          <p:val>
+                                            <p:strVal val="0.38*ppt_w"/>
+                                          </p:val>
+                                        </p:tav>
+                                        <p:tav tm="20000">
+                                          <p:val>
+                                            <p:fltVal val="0"/>
+                                          </p:val>
+                                        </p:tav>
+                                        <p:tav tm="25000">
+                                          <p:val>
+                                            <p:strVal val="-0.38*ppt_w"/>
+                                          </p:val>
+                                        </p:tav>
+                                        <p:tav tm="30000">
+                                          <p:val>
+                                            <p:strVal val="-0.71*ppt_w"/>
+                                          </p:val>
+                                        </p:tav>
+                                        <p:tav tm="35000">
+                                          <p:val>
+                                            <p:strVal val="-0.92*ppt_w"/>
+                                          </p:val>
+                                        </p:tav>
+                                        <p:tav tm="40000">
+                                          <p:val>
+                                            <p:strVal val="-ppt_w"/>
+                                          </p:val>
+                                        </p:tav>
+                                        <p:tav tm="45000">
+                                          <p:val>
+                                            <p:strVal val="-0.92*ppt_w"/>
+                                          </p:val>
+                                        </p:tav>
+                                        <p:tav tm="50000">
+                                          <p:val>
+                                            <p:strVal val="-0.71*ppt_w"/>
+                                          </p:val>
+                                        </p:tav>
+                                        <p:tav tm="55000">
+                                          <p:val>
+                                            <p:strVal val="-0.38*ppt_w"/>
+                                          </p:val>
+                                        </p:tav>
+                                        <p:tav tm="60000">
+                                          <p:val>
+                                            <p:fltVal val="0"/>
+                                          </p:val>
+                                        </p:tav>
+                                        <p:tav tm="65000">
+                                          <p:val>
+                                            <p:strVal val="0.38*ppt_w"/>
+                                          </p:val>
+                                        </p:tav>
+                                        <p:tav tm="70000">
+                                          <p:val>
+                                            <p:strVal val="0.71*ppt_w"/>
+                                          </p:val>
+                                        </p:tav>
+                                        <p:tav tm="75000">
+                                          <p:val>
+                                            <p:strVal val="0.92*ppt_w"/>
+                                          </p:val>
+                                        </p:tav>
+                                        <p:tav tm="80000">
+                                          <p:val>
+                                            <p:strVal val="ppt_w"/>
+                                          </p:val>
+                                        </p:tav>
+                                        <p:tav tm="85000">
+                                          <p:val>
+                                            <p:strVal val="0.92*ppt_w"/>
+                                          </p:val>
+                                        </p:tav>
+                                        <p:tav tm="90000">
+                                          <p:val>
+                                            <p:strVal val="0.71*ppt_w"/>
+                                          </p:val>
+                                        </p:tav>
+                                        <p:tav tm="95000">
+                                          <p:val>
+                                            <p:strVal val="0.38*ppt_w"/>
+                                          </p:val>
+                                        </p:tav>
+                                        <p:tav tm="100000">
+                                          <p:val>
+                                            <p:fltVal val="0"/>
+                                          </p:val>
+                                        </p:tav>
+                                      </p:tavLst>
+                                    </p:anim>
+                                    <p:anim calcmode="lin" valueType="num">
+                                      <p:cBhvr>
+                                        <p:cTn id="22" dur="2000"/>
+                                        <p:tgtEl>
+                                          <p:spTgt spid="11"/>
+                                        </p:tgtEl>
+                                        <p:attrNameLst>
+                                          <p:attrName>ppt_h</p:attrName>
+                                        </p:attrNameLst>
+                                      </p:cBhvr>
+                                      <p:tavLst>
+                                        <p:tav tm="0">
+                                          <p:val>
+                                            <p:strVal val="ppt_h"/>
+                                          </p:val>
+                                        </p:tav>
+                                        <p:tav tm="100000">
+                                          <p:val>
+                                            <p:strVal val="ppt_h"/>
+                                          </p:val>
+                                        </p:tav>
+                                      </p:tavLst>
+                                    </p:anim>
+                                    <p:set>
+                                      <p:cBhvr>
+                                        <p:cTn id="23" dur="1" fill="hold">
+                                          <p:stCondLst>
+                                            <p:cond delay="1999"/>
+                                          </p:stCondLst>
+                                        </p:cTn>
+                                        <p:tgtEl>
+                                          <p:spTgt spid="11"/>
+                                        </p:tgtEl>
+                                        <p:attrNameLst>
+                                          <p:attrName>style.visibility</p:attrName>
+                                        </p:attrNameLst>
+                                      </p:cBhvr>
+                                      <p:to>
+                                        <p:strVal val="hidden"/>
+                                      </p:to>
+                                    </p:set>
+                                  </p:childTnLst>
+                                </p:cTn>
+                              </p:par>
+                            </p:childTnLst>
+                          </p:cTn>
+                        </p:par>
+                      </p:childTnLst>
+                    </p:cTn>
+                  </p:par>
+                </p:childTnLst>
+              </p:cTn>
+              <p:prevCondLst>
+                <p:cond evt="onPrev" delay="0">
+                  <p:tgtEl>
+                    <p:sldTgt/>
+                  </p:tgtEl>
+                </p:cond>
+              </p:prevCondLst>
+              <p:nextCondLst>
+                <p:cond evt="onNext" delay="0">
+                  <p:tgtEl>
+                    <p:sldTgt/>
+                  </p:tgtEl>
+                </p:cond>
+              </p:nextCondLst>
+            </p:seq>
+          </p:childTnLst>
+        </p:cTn>
+      </p:par>
+    </p:tnLst>
+  </p:timing>
 </p:sld>
 </file>
 
@@ -4692,34 +5736,15 @@
           <a:p>
             <a:r>
               <a:rPr lang="en-US" dirty="0"/>
-              <a:t>PowerShell</a:t>
-            </a:r>
-          </a:p>
-        </p:txBody>
-      </p:sp>
-      <p:sp>
-        <p:nvSpPr>
-          <p:cNvPr id="3" name="Content Placeholder 2"/>
-          <p:cNvSpPr>
-            <a:spLocks noGrp="1"/>
-          </p:cNvSpPr>
-          <p:nvPr>
-            <p:ph idx="1"/>
-          </p:nvPr>
-        </p:nvSpPr>
-        <p:spPr/>
-        <p:txBody>
-          <a:bodyPr/>
-          <a:lstStyle/>
-          <a:p>
-            <a:endParaRPr lang="en-US"/>
+              <a:t>Raising and Catching Exceptions</a:t>
+            </a:r>
           </a:p>
         </p:txBody>
       </p:sp>
     </p:spTree>
     <p:extLst>
       <p:ext uri="{BB962C8B-B14F-4D97-AF65-F5344CB8AC3E}">
-        <p14:creationId xmlns:p14="http://schemas.microsoft.com/office/powerpoint/2010/main" val="4035976657"/>
+        <p14:creationId xmlns:p14="http://schemas.microsoft.com/office/powerpoint/2010/main" val="1027258953"/>
       </p:ext>
     </p:extLst>
   </p:cSld>

</xml_diff>